<commit_message>
Updated and completed module 3
</commit_message>
<xml_diff>
--- a/Module_2/presentations/module_2_presentation.pptx
+++ b/Module_2/presentations/module_2_presentation.pptx
@@ -54,16 +54,16 @@
     <p:sldId id="524" r:id="rId45"/>
     <p:sldId id="525" r:id="rId46"/>
     <p:sldId id="526" r:id="rId47"/>
-    <p:sldId id="528" r:id="rId48"/>
-    <p:sldId id="529" r:id="rId49"/>
-    <p:sldId id="530" r:id="rId50"/>
-    <p:sldId id="531" r:id="rId51"/>
-    <p:sldId id="527" r:id="rId52"/>
-    <p:sldId id="532" r:id="rId53"/>
-    <p:sldId id="533" r:id="rId54"/>
-    <p:sldId id="534" r:id="rId55"/>
-    <p:sldId id="535" r:id="rId56"/>
-    <p:sldId id="536" r:id="rId57"/>
+    <p:sldId id="529" r:id="rId48"/>
+    <p:sldId id="530" r:id="rId49"/>
+    <p:sldId id="531" r:id="rId50"/>
+    <p:sldId id="527" r:id="rId51"/>
+    <p:sldId id="532" r:id="rId52"/>
+    <p:sldId id="533" r:id="rId53"/>
+    <p:sldId id="534" r:id="rId54"/>
+    <p:sldId id="535" r:id="rId55"/>
+    <p:sldId id="536" r:id="rId56"/>
+    <p:sldId id="537" r:id="rId57"/>
     <p:sldId id="489" r:id="rId58"/>
   </p:sldIdLst>
   <p:sldSz cx="9144000" cy="6858000" type="screen4x3"/>
@@ -19145,145 +19145,6 @@
           <p:cNvPr id="2" name="Title 1">
             <a:extLst>
               <a:ext uri="{FF2B5EF4-FFF2-40B4-BE49-F238E27FC236}">
-                <a16:creationId xmlns:a16="http://schemas.microsoft.com/office/drawing/2014/main" id="{9A9C5AAE-FF27-0A4F-BE73-02B3F4FE1C84}"/>
-              </a:ext>
-            </a:extLst>
-          </p:cNvPr>
-          <p:cNvSpPr>
-            <a:spLocks noGrp="1"/>
-          </p:cNvSpPr>
-          <p:nvPr>
-            <p:ph type="title"/>
-          </p:nvPr>
-        </p:nvSpPr>
-        <p:spPr/>
-        <p:txBody>
-          <a:bodyPr/>
-          <a:lstStyle/>
-          <a:p>
-            <a:r>
-              <a:rPr lang="en-US" dirty="0"/>
-              <a:t>Go Structs (continued some more)</a:t>
-            </a:r>
-          </a:p>
-        </p:txBody>
-      </p:sp>
-      <p:sp>
-        <p:nvSpPr>
-          <p:cNvPr id="3" name="Text Placeholder 2">
-            <a:extLst>
-              <a:ext uri="{FF2B5EF4-FFF2-40B4-BE49-F238E27FC236}">
-                <a16:creationId xmlns:a16="http://schemas.microsoft.com/office/drawing/2014/main" id="{B811DF19-814D-2B4B-98DE-8FA8E1974F15}"/>
-              </a:ext>
-            </a:extLst>
-          </p:cNvPr>
-          <p:cNvSpPr>
-            <a:spLocks noGrp="1"/>
-          </p:cNvSpPr>
-          <p:nvPr>
-            <p:ph type="body" idx="1"/>
-          </p:nvPr>
-        </p:nvSpPr>
-        <p:spPr/>
-        <p:txBody>
-          <a:bodyPr/>
-          <a:lstStyle/>
-          <a:p>
-            <a:r>
-              <a:rPr lang="en-US" dirty="0"/>
-              <a:t> So you might be thinking “Yeah- well if structs are basically OBJECTS- how do I run FUNCTIONS against them?!?”</a:t>
-            </a:r>
-          </a:p>
-          <a:p>
-            <a:r>
-              <a:rPr lang="en-US" dirty="0"/>
-              <a:t> Glad you asked! Let’s take a quick look at how to reference a struct!</a:t>
-            </a:r>
-          </a:p>
-        </p:txBody>
-      </p:sp>
-      <p:pic>
-        <p:nvPicPr>
-          <p:cNvPr id="7170" name="Picture 2" descr="Image result for golang gopher">
-            <a:extLst>
-              <a:ext uri="{FF2B5EF4-FFF2-40B4-BE49-F238E27FC236}">
-                <a16:creationId xmlns:a16="http://schemas.microsoft.com/office/drawing/2014/main" id="{3FEC9AD2-E22D-3F41-99EC-240A91B07651}"/>
-              </a:ext>
-            </a:extLst>
-          </p:cNvPr>
-          <p:cNvPicPr>
-            <a:picLocks noChangeAspect="1" noChangeArrowheads="1"/>
-          </p:cNvPicPr>
-          <p:nvPr/>
-        </p:nvPicPr>
-        <p:blipFill>
-          <a:blip r:embed="rId2">
-            <a:extLst>
-              <a:ext uri="{28A0092B-C50C-407E-A947-70E740481C1C}">
-                <a14:useLocalDpi xmlns:a14="http://schemas.microsoft.com/office/drawing/2010/main" val="0"/>
-              </a:ext>
-            </a:extLst>
-          </a:blip>
-          <a:srcRect/>
-          <a:stretch>
-            <a:fillRect/>
-          </a:stretch>
-        </p:blipFill>
-        <p:spPr bwMode="auto">
-          <a:xfrm>
-            <a:off x="2979328" y="3754224"/>
-            <a:ext cx="2959100" cy="2743200"/>
-          </a:xfrm>
-          <a:prstGeom prst="rect">
-            <a:avLst/>
-          </a:prstGeom>
-          <a:noFill/>
-          <a:extLst>
-            <a:ext uri="{909E8E84-426E-40DD-AFC4-6F175D3DCCD1}">
-              <a14:hiddenFill xmlns:a14="http://schemas.microsoft.com/office/drawing/2010/main">
-                <a:solidFill>
-                  <a:srgbClr val="FFFFFF"/>
-                </a:solidFill>
-              </a14:hiddenFill>
-            </a:ext>
-          </a:extLst>
-        </p:spPr>
-      </p:pic>
-    </p:spTree>
-    <p:extLst>
-      <p:ext uri="{BB962C8B-B14F-4D97-AF65-F5344CB8AC3E}">
-        <p14:creationId xmlns:p14="http://schemas.microsoft.com/office/powerpoint/2010/main" val="1138603081"/>
-      </p:ext>
-    </p:extLst>
-  </p:cSld>
-  <p:clrMapOvr>
-    <a:masterClrMapping/>
-  </p:clrMapOvr>
-</p:sld>
-</file>
-
-<file path=ppt/slides/slide48.xml><?xml version="1.0" encoding="utf-8"?>
-<p:sld xmlns:a="http://schemas.openxmlformats.org/drawingml/2006/main" xmlns:r="http://schemas.openxmlformats.org/officeDocument/2006/relationships" xmlns:p="http://schemas.openxmlformats.org/presentationml/2006/main">
-  <p:cSld>
-    <p:spTree>
-      <p:nvGrpSpPr>
-        <p:cNvPr id="1" name=""/>
-        <p:cNvGrpSpPr/>
-        <p:nvPr/>
-      </p:nvGrpSpPr>
-      <p:grpSpPr>
-        <a:xfrm>
-          <a:off x="0" y="0"/>
-          <a:ext cx="0" cy="0"/>
-          <a:chOff x="0" y="0"/>
-          <a:chExt cx="0" cy="0"/>
-        </a:xfrm>
-      </p:grpSpPr>
-      <p:sp>
-        <p:nvSpPr>
-          <p:cNvPr id="2" name="Title 1">
-            <a:extLst>
-              <a:ext uri="{FF2B5EF4-FFF2-40B4-BE49-F238E27FC236}">
                 <a16:creationId xmlns:a16="http://schemas.microsoft.com/office/drawing/2014/main" id="{3D44C771-577D-4E47-9637-6A35C6A119FB}"/>
               </a:ext>
             </a:extLst>
@@ -19657,7 +19518,7 @@
 </p:sld>
 </file>
 
-<file path=ppt/slides/slide49.xml><?xml version="1.0" encoding="utf-8"?>
+<file path=ppt/slides/slide48.xml><?xml version="1.0" encoding="utf-8"?>
 <p:sld xmlns:a="http://schemas.openxmlformats.org/drawingml/2006/main" xmlns:r="http://schemas.openxmlformats.org/officeDocument/2006/relationships" xmlns:p="http://schemas.openxmlformats.org/presentationml/2006/main">
   <p:cSld>
     <p:spTree>
@@ -20039,6 +19900,162 @@
     <p:extLst>
       <p:ext uri="{BB962C8B-B14F-4D97-AF65-F5344CB8AC3E}">
         <p14:creationId xmlns:p14="http://schemas.microsoft.com/office/powerpoint/2010/main" val="4153244075"/>
+      </p:ext>
+    </p:extLst>
+  </p:cSld>
+  <p:clrMapOvr>
+    <a:masterClrMapping/>
+  </p:clrMapOvr>
+</p:sld>
+</file>
+
+<file path=ppt/slides/slide49.xml><?xml version="1.0" encoding="utf-8"?>
+<p:sld xmlns:a="http://schemas.openxmlformats.org/drawingml/2006/main" xmlns:r="http://schemas.openxmlformats.org/officeDocument/2006/relationships" xmlns:p="http://schemas.openxmlformats.org/presentationml/2006/main">
+  <p:cSld>
+    <p:spTree>
+      <p:nvGrpSpPr>
+        <p:cNvPr id="1" name=""/>
+        <p:cNvGrpSpPr/>
+        <p:nvPr/>
+      </p:nvGrpSpPr>
+      <p:grpSpPr>
+        <a:xfrm>
+          <a:off x="0" y="0"/>
+          <a:ext cx="0" cy="0"/>
+          <a:chOff x="0" y="0"/>
+          <a:chExt cx="0" cy="0"/>
+        </a:xfrm>
+      </p:grpSpPr>
+      <p:sp>
+        <p:nvSpPr>
+          <p:cNvPr id="2" name="Title 1">
+            <a:extLst>
+              <a:ext uri="{FF2B5EF4-FFF2-40B4-BE49-F238E27FC236}">
+                <a16:creationId xmlns:a16="http://schemas.microsoft.com/office/drawing/2014/main" id="{DF383B22-1FBF-1545-9CB1-7A87EEC6DF68}"/>
+              </a:ext>
+            </a:extLst>
+          </p:cNvPr>
+          <p:cNvSpPr>
+            <a:spLocks noGrp="1"/>
+          </p:cNvSpPr>
+          <p:nvPr>
+            <p:ph type="title"/>
+          </p:nvPr>
+        </p:nvSpPr>
+        <p:spPr/>
+        <p:txBody>
+          <a:bodyPr/>
+          <a:lstStyle/>
+          <a:p>
+            <a:r>
+              <a:rPr lang="en-US" dirty="0"/>
+              <a:t>Structs and functions</a:t>
+            </a:r>
+          </a:p>
+        </p:txBody>
+      </p:sp>
+      <p:sp>
+        <p:nvSpPr>
+          <p:cNvPr id="3" name="Text Placeholder 2">
+            <a:extLst>
+              <a:ext uri="{FF2B5EF4-FFF2-40B4-BE49-F238E27FC236}">
+                <a16:creationId xmlns:a16="http://schemas.microsoft.com/office/drawing/2014/main" id="{6726EF7F-6539-C844-A3A1-167916391BB1}"/>
+              </a:ext>
+            </a:extLst>
+          </p:cNvPr>
+          <p:cNvSpPr>
+            <a:spLocks noGrp="1"/>
+          </p:cNvSpPr>
+          <p:nvPr>
+            <p:ph type="body" idx="1"/>
+          </p:nvPr>
+        </p:nvSpPr>
+        <p:spPr/>
+        <p:txBody>
+          <a:bodyPr/>
+          <a:lstStyle/>
+          <a:p>
+            <a:r>
+              <a:rPr lang="en-US" dirty="0"/>
+              <a:t>So as you can see- we altered the function method and we are pointing back at our struct as the </a:t>
+            </a:r>
+            <a:r>
+              <a:rPr lang="en-US" b="1" dirty="0"/>
+              <a:t>receiver</a:t>
+            </a:r>
+            <a:r>
+              <a:rPr lang="en-US" dirty="0"/>
+              <a:t> of the output of the function. </a:t>
+            </a:r>
+          </a:p>
+          <a:p>
+            <a:r>
+              <a:rPr lang="en-US" dirty="0"/>
+              <a:t>You then call the function the same way you would normally (in most languages) call a function within the object- with </a:t>
+            </a:r>
+            <a:r>
+              <a:rPr lang="en-US" b="1" dirty="0" err="1"/>
+              <a:t>structName.functionName</a:t>
+            </a:r>
+            <a:r>
+              <a:rPr lang="en-US" b="1" dirty="0"/>
+              <a:t>()</a:t>
+            </a:r>
+            <a:endParaRPr lang="en-US" dirty="0"/>
+          </a:p>
+        </p:txBody>
+      </p:sp>
+      <p:pic>
+        <p:nvPicPr>
+          <p:cNvPr id="10242" name="Picture 2" descr="Image result for golang gopher">
+            <a:extLst>
+              <a:ext uri="{FF2B5EF4-FFF2-40B4-BE49-F238E27FC236}">
+                <a16:creationId xmlns:a16="http://schemas.microsoft.com/office/drawing/2014/main" id="{C26AFA25-03D2-7644-9D07-F355C0EE7B79}"/>
+              </a:ext>
+            </a:extLst>
+          </p:cNvPr>
+          <p:cNvPicPr>
+            <a:picLocks noChangeAspect="1" noChangeArrowheads="1"/>
+          </p:cNvPicPr>
+          <p:nvPr/>
+        </p:nvPicPr>
+        <p:blipFill>
+          <a:blip r:embed="rId2">
+            <a:extLst>
+              <a:ext uri="{28A0092B-C50C-407E-A947-70E740481C1C}">
+                <a14:useLocalDpi xmlns:a14="http://schemas.microsoft.com/office/drawing/2010/main" val="0"/>
+              </a:ext>
+            </a:extLst>
+          </a:blip>
+          <a:srcRect/>
+          <a:stretch>
+            <a:fillRect/>
+          </a:stretch>
+        </p:blipFill>
+        <p:spPr bwMode="auto">
+          <a:xfrm>
+            <a:off x="2560229" y="4267199"/>
+            <a:ext cx="3797300" cy="2133600"/>
+          </a:xfrm>
+          <a:prstGeom prst="rect">
+            <a:avLst/>
+          </a:prstGeom>
+          <a:noFill/>
+          <a:extLst>
+            <a:ext uri="{909E8E84-426E-40DD-AFC4-6F175D3DCCD1}">
+              <a14:hiddenFill xmlns:a14="http://schemas.microsoft.com/office/drawing/2010/main">
+                <a:solidFill>
+                  <a:srgbClr val="FFFFFF"/>
+                </a:solidFill>
+              </a14:hiddenFill>
+            </a:ext>
+          </a:extLst>
+        </p:spPr>
+      </p:pic>
+    </p:spTree>
+    <p:extLst>
+      <p:ext uri="{BB962C8B-B14F-4D97-AF65-F5344CB8AC3E}">
+        <p14:creationId xmlns:p14="http://schemas.microsoft.com/office/powerpoint/2010/main" val="3190768411"/>
       </p:ext>
     </p:extLst>
   </p:cSld>
@@ -20410,162 +20427,6 @@
           <p:cNvPr id="2" name="Title 1">
             <a:extLst>
               <a:ext uri="{FF2B5EF4-FFF2-40B4-BE49-F238E27FC236}">
-                <a16:creationId xmlns:a16="http://schemas.microsoft.com/office/drawing/2014/main" id="{DF383B22-1FBF-1545-9CB1-7A87EEC6DF68}"/>
-              </a:ext>
-            </a:extLst>
-          </p:cNvPr>
-          <p:cNvSpPr>
-            <a:spLocks noGrp="1"/>
-          </p:cNvSpPr>
-          <p:nvPr>
-            <p:ph type="title"/>
-          </p:nvPr>
-        </p:nvSpPr>
-        <p:spPr/>
-        <p:txBody>
-          <a:bodyPr/>
-          <a:lstStyle/>
-          <a:p>
-            <a:r>
-              <a:rPr lang="en-US" dirty="0"/>
-              <a:t>Structs and functions</a:t>
-            </a:r>
-          </a:p>
-        </p:txBody>
-      </p:sp>
-      <p:sp>
-        <p:nvSpPr>
-          <p:cNvPr id="3" name="Text Placeholder 2">
-            <a:extLst>
-              <a:ext uri="{FF2B5EF4-FFF2-40B4-BE49-F238E27FC236}">
-                <a16:creationId xmlns:a16="http://schemas.microsoft.com/office/drawing/2014/main" id="{6726EF7F-6539-C844-A3A1-167916391BB1}"/>
-              </a:ext>
-            </a:extLst>
-          </p:cNvPr>
-          <p:cNvSpPr>
-            <a:spLocks noGrp="1"/>
-          </p:cNvSpPr>
-          <p:nvPr>
-            <p:ph type="body" idx="1"/>
-          </p:nvPr>
-        </p:nvSpPr>
-        <p:spPr/>
-        <p:txBody>
-          <a:bodyPr/>
-          <a:lstStyle/>
-          <a:p>
-            <a:r>
-              <a:rPr lang="en-US" dirty="0"/>
-              <a:t>So as you can see- we altered the function method and we are pointing back at our struct as the </a:t>
-            </a:r>
-            <a:r>
-              <a:rPr lang="en-US" b="1" dirty="0"/>
-              <a:t>receiver</a:t>
-            </a:r>
-            <a:r>
-              <a:rPr lang="en-US" dirty="0"/>
-              <a:t> of the output of the function. </a:t>
-            </a:r>
-          </a:p>
-          <a:p>
-            <a:r>
-              <a:rPr lang="en-US" dirty="0"/>
-              <a:t>You then call the function the same way you would normally (in most languages) call a function within the object- with </a:t>
-            </a:r>
-            <a:r>
-              <a:rPr lang="en-US" b="1" dirty="0" err="1"/>
-              <a:t>structName.functionName</a:t>
-            </a:r>
-            <a:r>
-              <a:rPr lang="en-US" b="1" dirty="0"/>
-              <a:t>()</a:t>
-            </a:r>
-            <a:endParaRPr lang="en-US" dirty="0"/>
-          </a:p>
-        </p:txBody>
-      </p:sp>
-      <p:pic>
-        <p:nvPicPr>
-          <p:cNvPr id="10242" name="Picture 2" descr="Image result for golang gopher">
-            <a:extLst>
-              <a:ext uri="{FF2B5EF4-FFF2-40B4-BE49-F238E27FC236}">
-                <a16:creationId xmlns:a16="http://schemas.microsoft.com/office/drawing/2014/main" id="{C26AFA25-03D2-7644-9D07-F355C0EE7B79}"/>
-              </a:ext>
-            </a:extLst>
-          </p:cNvPr>
-          <p:cNvPicPr>
-            <a:picLocks noChangeAspect="1" noChangeArrowheads="1"/>
-          </p:cNvPicPr>
-          <p:nvPr/>
-        </p:nvPicPr>
-        <p:blipFill>
-          <a:blip r:embed="rId2">
-            <a:extLst>
-              <a:ext uri="{28A0092B-C50C-407E-A947-70E740481C1C}">
-                <a14:useLocalDpi xmlns:a14="http://schemas.microsoft.com/office/drawing/2010/main" val="0"/>
-              </a:ext>
-            </a:extLst>
-          </a:blip>
-          <a:srcRect/>
-          <a:stretch>
-            <a:fillRect/>
-          </a:stretch>
-        </p:blipFill>
-        <p:spPr bwMode="auto">
-          <a:xfrm>
-            <a:off x="2560229" y="4267199"/>
-            <a:ext cx="3797300" cy="2133600"/>
-          </a:xfrm>
-          <a:prstGeom prst="rect">
-            <a:avLst/>
-          </a:prstGeom>
-          <a:noFill/>
-          <a:extLst>
-            <a:ext uri="{909E8E84-426E-40DD-AFC4-6F175D3DCCD1}">
-              <a14:hiddenFill xmlns:a14="http://schemas.microsoft.com/office/drawing/2010/main">
-                <a:solidFill>
-                  <a:srgbClr val="FFFFFF"/>
-                </a:solidFill>
-              </a14:hiddenFill>
-            </a:ext>
-          </a:extLst>
-        </p:spPr>
-      </p:pic>
-    </p:spTree>
-    <p:extLst>
-      <p:ext uri="{BB962C8B-B14F-4D97-AF65-F5344CB8AC3E}">
-        <p14:creationId xmlns:p14="http://schemas.microsoft.com/office/powerpoint/2010/main" val="3190768411"/>
-      </p:ext>
-    </p:extLst>
-  </p:cSld>
-  <p:clrMapOvr>
-    <a:masterClrMapping/>
-  </p:clrMapOvr>
-</p:sld>
-</file>
-
-<file path=ppt/slides/slide51.xml><?xml version="1.0" encoding="utf-8"?>
-<p:sld xmlns:a="http://schemas.openxmlformats.org/drawingml/2006/main" xmlns:r="http://schemas.openxmlformats.org/officeDocument/2006/relationships" xmlns:p="http://schemas.openxmlformats.org/presentationml/2006/main">
-  <p:cSld>
-    <p:spTree>
-      <p:nvGrpSpPr>
-        <p:cNvPr id="1" name=""/>
-        <p:cNvGrpSpPr/>
-        <p:nvPr/>
-      </p:nvGrpSpPr>
-      <p:grpSpPr>
-        <a:xfrm>
-          <a:off x="0" y="0"/>
-          <a:ext cx="0" cy="0"/>
-          <a:chOff x="0" y="0"/>
-          <a:chExt cx="0" cy="0"/>
-        </a:xfrm>
-      </p:grpSpPr>
-      <p:sp>
-        <p:nvSpPr>
-          <p:cNvPr id="2" name="Title 1">
-            <a:extLst>
-              <a:ext uri="{FF2B5EF4-FFF2-40B4-BE49-F238E27FC236}">
                 <a16:creationId xmlns:a16="http://schemas.microsoft.com/office/drawing/2014/main" id="{2F6A0346-CF4A-B843-883D-FFB45B50FD75}"/>
               </a:ext>
             </a:extLst>
@@ -20721,7 +20582,7 @@
 </p:sld>
 </file>
 
-<file path=ppt/slides/slide52.xml><?xml version="1.0" encoding="utf-8"?>
+<file path=ppt/slides/slide51.xml><?xml version="1.0" encoding="utf-8"?>
 <p:sld xmlns:a="http://schemas.openxmlformats.org/drawingml/2006/main" xmlns:r="http://schemas.openxmlformats.org/officeDocument/2006/relationships" xmlns:p="http://schemas.openxmlformats.org/presentationml/2006/main">
   <p:cSld>
     <p:spTree>
@@ -20960,7 +20821,7 @@
 </p:sld>
 </file>
 
-<file path=ppt/slides/slide53.xml><?xml version="1.0" encoding="utf-8"?>
+<file path=ppt/slides/slide52.xml><?xml version="1.0" encoding="utf-8"?>
 <p:sld xmlns:a="http://schemas.openxmlformats.org/drawingml/2006/main" xmlns:r="http://schemas.openxmlformats.org/officeDocument/2006/relationships" xmlns:p="http://schemas.openxmlformats.org/presentationml/2006/main">
   <p:cSld>
     <p:spTree>
@@ -21126,7 +20987,7 @@
 </p:sld>
 </file>
 
-<file path=ppt/slides/slide54.xml><?xml version="1.0" encoding="utf-8"?>
+<file path=ppt/slides/slide53.xml><?xml version="1.0" encoding="utf-8"?>
 <p:sld xmlns:a="http://schemas.openxmlformats.org/drawingml/2006/main" xmlns:r="http://schemas.openxmlformats.org/officeDocument/2006/relationships" xmlns:p="http://schemas.openxmlformats.org/presentationml/2006/main">
   <p:cSld>
     <p:spTree>
@@ -21284,7 +21145,7 @@
 </p:sld>
 </file>
 
-<file path=ppt/slides/slide55.xml><?xml version="1.0" encoding="utf-8"?>
+<file path=ppt/slides/slide54.xml><?xml version="1.0" encoding="utf-8"?>
 <p:sld xmlns:a="http://schemas.openxmlformats.org/drawingml/2006/main" xmlns:r="http://schemas.openxmlformats.org/officeDocument/2006/relationships" xmlns:p="http://schemas.openxmlformats.org/presentationml/2006/main">
   <p:cSld>
     <p:spTree>
@@ -21439,7 +21300,7 @@
 </p:sld>
 </file>
 
-<file path=ppt/slides/slide56.xml><?xml version="1.0" encoding="utf-8"?>
+<file path=ppt/slides/slide55.xml><?xml version="1.0" encoding="utf-8"?>
 <p:sld xmlns:a="http://schemas.openxmlformats.org/drawingml/2006/main" xmlns:r="http://schemas.openxmlformats.org/officeDocument/2006/relationships" xmlns:p="http://schemas.openxmlformats.org/presentationml/2006/main">
   <p:cSld>
     <p:spTree>
@@ -21585,6 +21446,153 @@
     <p:extLst>
       <p:ext uri="{BB962C8B-B14F-4D97-AF65-F5344CB8AC3E}">
         <p14:creationId xmlns:p14="http://schemas.microsoft.com/office/powerpoint/2010/main" val="1830205327"/>
+      </p:ext>
+    </p:extLst>
+  </p:cSld>
+  <p:clrMapOvr>
+    <a:masterClrMapping/>
+  </p:clrMapOvr>
+</p:sld>
+</file>
+
+<file path=ppt/slides/slide56.xml><?xml version="1.0" encoding="utf-8"?>
+<p:sld xmlns:a="http://schemas.openxmlformats.org/drawingml/2006/main" xmlns:r="http://schemas.openxmlformats.org/officeDocument/2006/relationships" xmlns:p="http://schemas.openxmlformats.org/presentationml/2006/main">
+  <p:cSld>
+    <p:spTree>
+      <p:nvGrpSpPr>
+        <p:cNvPr id="1" name=""/>
+        <p:cNvGrpSpPr/>
+        <p:nvPr/>
+      </p:nvGrpSpPr>
+      <p:grpSpPr>
+        <a:xfrm>
+          <a:off x="0" y="0"/>
+          <a:ext cx="0" cy="0"/>
+          <a:chOff x="0" y="0"/>
+          <a:chExt cx="0" cy="0"/>
+        </a:xfrm>
+      </p:grpSpPr>
+      <p:sp>
+        <p:nvSpPr>
+          <p:cNvPr id="2" name="Title 1">
+            <a:extLst>
+              <a:ext uri="{FF2B5EF4-FFF2-40B4-BE49-F238E27FC236}">
+                <a16:creationId xmlns:a16="http://schemas.microsoft.com/office/drawing/2014/main" id="{C1A40CC7-A7D1-D140-A656-A637A8D27C80}"/>
+              </a:ext>
+            </a:extLst>
+          </p:cNvPr>
+          <p:cNvSpPr>
+            <a:spLocks noGrp="1"/>
+          </p:cNvSpPr>
+          <p:nvPr>
+            <p:ph type="title"/>
+          </p:nvPr>
+        </p:nvSpPr>
+        <p:spPr/>
+        <p:txBody>
+          <a:bodyPr/>
+          <a:lstStyle/>
+          <a:p>
+            <a:r>
+              <a:rPr lang="en-US" dirty="0"/>
+              <a:t>Interface Type assertions</a:t>
+            </a:r>
+          </a:p>
+        </p:txBody>
+      </p:sp>
+      <p:sp>
+        <p:nvSpPr>
+          <p:cNvPr id="3" name="Text Placeholder 2">
+            <a:extLst>
+              <a:ext uri="{FF2B5EF4-FFF2-40B4-BE49-F238E27FC236}">
+                <a16:creationId xmlns:a16="http://schemas.microsoft.com/office/drawing/2014/main" id="{618263CB-2213-054B-BA1A-4FBE06B3C96F}"/>
+              </a:ext>
+            </a:extLst>
+          </p:cNvPr>
+          <p:cNvSpPr>
+            <a:spLocks noGrp="1"/>
+          </p:cNvSpPr>
+          <p:nvPr>
+            <p:ph type="body" idx="1"/>
+          </p:nvPr>
+        </p:nvSpPr>
+        <p:spPr/>
+        <p:txBody>
+          <a:bodyPr/>
+          <a:lstStyle/>
+          <a:p>
+            <a:r>
+              <a:rPr lang="en-US" dirty="0"/>
+              <a:t> A </a:t>
+            </a:r>
+            <a:r>
+              <a:rPr lang="en-US" i="1" dirty="0"/>
+              <a:t>type assertion</a:t>
+            </a:r>
+            <a:r>
+              <a:rPr lang="en-US" dirty="0"/>
+              <a:t> provides access to an interface value's underlying concrete value.</a:t>
+            </a:r>
+          </a:p>
+          <a:p>
+            <a:r>
+              <a:rPr lang="en-US" dirty="0"/>
+              <a:t> So you can easily take an interface {} with various values and assert them as strings (check out the lab). </a:t>
+            </a:r>
+          </a:p>
+        </p:txBody>
+      </p:sp>
+      <p:pic>
+        <p:nvPicPr>
+          <p:cNvPr id="1026" name="Picture 2" descr="Image result for go gopher">
+            <a:extLst>
+              <a:ext uri="{FF2B5EF4-FFF2-40B4-BE49-F238E27FC236}">
+                <a16:creationId xmlns:a16="http://schemas.microsoft.com/office/drawing/2014/main" id="{EEF60A29-6E7B-CE40-A30C-E85512EC2265}"/>
+              </a:ext>
+            </a:extLst>
+          </p:cNvPr>
+          <p:cNvPicPr>
+            <a:picLocks noChangeAspect="1" noChangeArrowheads="1"/>
+          </p:cNvPicPr>
+          <p:nvPr/>
+        </p:nvPicPr>
+        <p:blipFill>
+          <a:blip r:embed="rId2">
+            <a:extLst>
+              <a:ext uri="{28A0092B-C50C-407E-A947-70E740481C1C}">
+                <a14:useLocalDpi xmlns:a14="http://schemas.microsoft.com/office/drawing/2010/main" val="0"/>
+              </a:ext>
+            </a:extLst>
+          </a:blip>
+          <a:srcRect/>
+          <a:stretch>
+            <a:fillRect/>
+          </a:stretch>
+        </p:blipFill>
+        <p:spPr bwMode="auto">
+          <a:xfrm>
+            <a:off x="2326129" y="3596129"/>
+            <a:ext cx="3492500" cy="2324100"/>
+          </a:xfrm>
+          <a:prstGeom prst="rect">
+            <a:avLst/>
+          </a:prstGeom>
+          <a:noFill/>
+          <a:extLst>
+            <a:ext uri="{909E8E84-426E-40DD-AFC4-6F175D3DCCD1}">
+              <a14:hiddenFill xmlns:a14="http://schemas.microsoft.com/office/drawing/2010/main">
+                <a:solidFill>
+                  <a:srgbClr val="FFFFFF"/>
+                </a:solidFill>
+              </a14:hiddenFill>
+            </a:ext>
+          </a:extLst>
+        </p:spPr>
+      </p:pic>
+    </p:spTree>
+    <p:extLst>
+      <p:ext uri="{BB962C8B-B14F-4D97-AF65-F5344CB8AC3E}">
+        <p14:creationId xmlns:p14="http://schemas.microsoft.com/office/powerpoint/2010/main" val="2915404208"/>
       </p:ext>
     </p:extLst>
   </p:cSld>

</xml_diff>